<commit_message>
small build updates, google analytics
</commit_message>
<xml_diff>
--- a/docs/code_files/formats/part2_intro_code_pptx.pptx
+++ b/docs/code_files/formats/part2_intro_code_pptx.pptx
@@ -4169,8 +4169,8 @@
                 <a:tableStyleId>{5C22544A-7EE6-4342-B048-85BDC9FD1C3A}</a:tableStyleId>
               </a:tblPr>
               <a:tblGrid>
-                <a:gridCol w="2552700"/>
-                <a:gridCol w="2552700"/>
+                <a:gridCol w="2133600"/>
+                <a:gridCol w="2984500"/>
               </a:tblGrid>
               <a:tr h="0">
                 <a:tc>
@@ -6409,6 +6409,114 @@
           </a:p>
         </p:txBody>
       </p:sp>
+      <p:sp>
+        <p:nvSpPr>
+          <p:cNvPr id="3" name="Content Placeholder 2"/>
+          <p:cNvSpPr>
+            <a:spLocks noGrp="1"/>
+          </p:cNvSpPr>
+          <p:nvPr>
+            <p:ph idx="1"/>
+          </p:nvPr>
+        </p:nvSpPr>
+        <p:spPr/>
+        <p:txBody>
+          <a:bodyPr/>
+          <a:lstStyle/>
+          <a:p>
+            <a:pPr lvl="0"/>
+            <a:r>
+              <a:rPr/>
+              <a:t>Add caption text that is linked to OHSU webpage (&amp; align center):</a:t>
+            </a:r>
+          </a:p>
+        </p:txBody>
+      </p:sp>
+      <p:pic>
+        <p:nvPicPr>
+          <p:cNvPr descr="https://github.com/OHSU-OCTRI-BERD/Quarto_BERD_2025/blob/main/images/ohsu_logo.jpg?raw=true" id="0" name="Picture 1"/>
+          <p:cNvPicPr>
+            <a:picLocks noGrp="1" noChangeAspect="1"/>
+          </p:cNvPicPr>
+          <p:nvPr/>
+        </p:nvPicPr>
+        <p:blipFill>
+          <a:blip r:embed="rId3"/>
+          <a:stretch>
+            <a:fillRect/>
+          </a:stretch>
+        </p:blipFill>
+        <p:spPr bwMode="auto">
+          <a:xfrm>
+            <a:off x="4953000" y="203200"/>
+            <a:ext cx="2324100" cy="3873500"/>
+          </a:xfrm>
+          <a:prstGeom prst="rect">
+            <a:avLst/>
+          </a:prstGeom>
+          <a:noFill/>
+          <a:ln w="9525">
+            <a:noFill/>
+            <a:headEnd/>
+            <a:tailEnd/>
+          </a:ln>
+        </p:spPr>
+      </p:pic>
+      <p:sp>
+        <p:nvSpPr>
+          <p:cNvPr id="1" name="TextBox 3"/>
+          <p:cNvSpPr txBox="1"/>
+          <p:nvPr/>
+        </p:nvSpPr>
+        <p:spPr>
+          <a:xfrm>
+            <a:off x="3568700" y="4076700"/>
+            <a:ext cx="5105400" cy="508000"/>
+          </a:xfrm>
+          <a:prstGeom prst="rect">
+            <a:avLst/>
+          </a:prstGeom>
+          <a:noFill/>
+        </p:spPr>
+        <p:txBody>
+          <a:bodyPr/>
+          <a:lstStyle/>
+          <a:p>
+            <a:pPr lvl="0" indent="0" marL="0" algn="ctr">
+              <a:buNone/>
+            </a:pPr>
+            <a:r>
+              <a:rPr>
+                <a:hlinkClick r:id="rId4"/>
+              </a:rPr>
+              <a:t>Caption text with linked url</a:t>
+            </a:r>
+          </a:p>
+        </p:txBody>
+      </p:sp>
+      <p:sp>
+        <p:nvSpPr>
+          <p:cNvPr id="3" name="Content Placeholder 2"/>
+          <p:cNvSpPr>
+            <a:spLocks noGrp="1"/>
+          </p:cNvSpPr>
+          <p:nvPr>
+            <p:ph idx="1"/>
+          </p:nvPr>
+        </p:nvSpPr>
+        <p:spPr/>
+        <p:txBody>
+          <a:bodyPr/>
+          <a:lstStyle/>
+          <a:p>
+            <a:pPr lvl="0"/>
+            <a:r>
+              <a:rPr/>
+              <a:t>Logo image itself is linked to OHSU webpage (&amp; align right):</a:t>
+            </a:r>
+          </a:p>
+        </p:txBody>
+      </p:sp>
     </p:spTree>
   </p:cSld>
 </p:sld>
@@ -6431,32 +6539,11 @@
           <a:chExt cx="0" cy="0"/>
         </a:xfrm>
       </p:grpSpPr>
-      <p:sp>
-        <p:nvSpPr>
-          <p:cNvPr id="4" name="Text Placeholder 3"/>
-          <p:cNvSpPr>
-            <a:spLocks noGrp="1"/>
-          </p:cNvSpPr>
-          <p:nvPr>
-            <p:ph idx="2" sz="half" type="body"/>
-          </p:nvPr>
-        </p:nvSpPr>
-        <p:spPr/>
-        <p:txBody>
-          <a:bodyPr/>
-          <a:lstStyle/>
-          <a:p>
-            <a:pPr lvl="0"/>
-            <a:r>
-              <a:rPr/>
-              <a:t>Add caption text that is linked to OHSU webpage (&amp; align center):</a:t>
-            </a:r>
-          </a:p>
-        </p:txBody>
-      </p:sp>
       <p:pic>
         <p:nvPicPr>
-          <p:cNvPr descr="https://github.com/OHSU-OCTRI-BERD/Quarto_BERD_2025/blob/main/images/ohsu_logo.jpg?raw=true" id="0" name="Picture 1"/>
+          <p:cNvPr descr="https://github.com/OHSU-OCTRI-BERD/Quarto_BERD_2025/blob/main/images/ohsu_logo.jpg?raw=true" id="0" name="Picture 1">
+            <a:hlinkClick r:id="rId3"/>
+          </p:cNvPr>
           <p:cNvPicPr>
             <a:picLocks noGrp="1" noChangeAspect="1"/>
           </p:cNvPicPr>
@@ -6470,8 +6557,8 @@
         </p:blipFill>
         <p:spPr bwMode="auto">
           <a:xfrm>
-            <a:off x="4953000" y="203200"/>
-            <a:ext cx="2324100" cy="3873500"/>
+            <a:off x="3556000" y="1193800"/>
+            <a:ext cx="2032000" cy="3390900"/>
           </a:xfrm>
           <a:prstGeom prst="rect">
             <a:avLst/>
@@ -6484,38 +6571,6 @@
           </a:ln>
         </p:spPr>
       </p:pic>
-      <p:sp>
-        <p:nvSpPr>
-          <p:cNvPr id="1" name="TextBox 3"/>
-          <p:cNvSpPr txBox="1"/>
-          <p:nvPr/>
-        </p:nvSpPr>
-        <p:spPr>
-          <a:xfrm>
-            <a:off x="3568700" y="4076700"/>
-            <a:ext cx="5105400" cy="508000"/>
-          </a:xfrm>
-          <a:prstGeom prst="rect">
-            <a:avLst/>
-          </a:prstGeom>
-          <a:noFill/>
-        </p:spPr>
-        <p:txBody>
-          <a:bodyPr/>
-          <a:lstStyle/>
-          <a:p>
-            <a:pPr lvl="0" indent="0" marL="0" algn="ctr">
-              <a:buNone/>
-            </a:pPr>
-            <a:r>
-              <a:rPr>
-                <a:hlinkClick r:id="rId3"/>
-              </a:rPr>
-              <a:t>Caption text with linked url</a:t>
-            </a:r>
-          </a:p>
-        </p:txBody>
-      </p:sp>
     </p:spTree>
   </p:cSld>
 </p:sld>
@@ -6552,18 +6607,6 @@
         <p:txBody>
           <a:bodyPr/>
           <a:lstStyle/>
-          <a:p>
-            <a:pPr lvl="0"/>
-            <a:r>
-              <a:rPr/>
-              <a:t>Logo image itself is linked to OHSU webpage (&amp; align right):</a:t>
-            </a:r>
-          </a:p>
-          <a:p>
-            <a:pPr lvl="0" indent="0" marL="0">
-              <a:buNone/>
-            </a:pPr>
-          </a:p>
           <a:p>
             <a:pPr lvl="0" indent="0" marL="0">
               <a:spcBef>

</xml_diff>